<commit_message>
Entrega Segunda Pre Entrega Proyecto Final
</commit_message>
<xml_diff>
--- a/Desafios/Análisis_Datos_Fútbol.pptx
+++ b/Desafios/Análisis_Datos_Fútbol.pptx
@@ -14,8 +14,12 @@
     <p:sldId id="266" r:id="rId8"/>
     <p:sldId id="264" r:id="rId9"/>
     <p:sldId id="267" r:id="rId10"/>
-    <p:sldId id="269" r:id="rId11"/>
-    <p:sldId id="270" r:id="rId12"/>
+    <p:sldId id="273" r:id="rId11"/>
+    <p:sldId id="274" r:id="rId12"/>
+    <p:sldId id="269" r:id="rId13"/>
+    <p:sldId id="270" r:id="rId14"/>
+    <p:sldId id="271" r:id="rId15"/>
+    <p:sldId id="272" r:id="rId16"/>
   </p:sldIdLst>
   <p:sldSz cx="12192000" cy="6858000"/>
   <p:notesSz cx="6858000" cy="9144000"/>
@@ -114,6 +118,11 @@
       </a:defRPr>
     </a:lvl9pPr>
   </p:defaultTextStyle>
+  <p:extLst>
+    <p:ext uri="{EFAFB233-063F-42B5-8137-9DF3F51BA10A}">
+      <p15:sldGuideLst xmlns:p15="http://schemas.microsoft.com/office/powerpoint/2012/main"/>
+    </p:ext>
+  </p:extLst>
 </p:presentation>
 </file>
 
@@ -266,7 +275,7 @@
           <a:p>
             <a:fld id="{9B0E0D05-D84D-45F3-A168-A386D8E82322}" type="datetimeFigureOut">
               <a:rPr lang="es-AR" smtClean="0"/>
-              <a:t>7/8/2023</a:t>
+              <a:t>14/8/2023</a:t>
             </a:fld>
             <a:endParaRPr lang="es-AR"/>
           </a:p>
@@ -466,7 +475,7 @@
           <a:p>
             <a:fld id="{9B0E0D05-D84D-45F3-A168-A386D8E82322}" type="datetimeFigureOut">
               <a:rPr lang="es-AR" smtClean="0"/>
-              <a:t>7/8/2023</a:t>
+              <a:t>14/8/2023</a:t>
             </a:fld>
             <a:endParaRPr lang="es-AR"/>
           </a:p>
@@ -676,7 +685,7 @@
           <a:p>
             <a:fld id="{9B0E0D05-D84D-45F3-A168-A386D8E82322}" type="datetimeFigureOut">
               <a:rPr lang="es-AR" smtClean="0"/>
-              <a:t>7/8/2023</a:t>
+              <a:t>14/8/2023</a:t>
             </a:fld>
             <a:endParaRPr lang="es-AR"/>
           </a:p>
@@ -876,7 +885,7 @@
           <a:p>
             <a:fld id="{9B0E0D05-D84D-45F3-A168-A386D8E82322}" type="datetimeFigureOut">
               <a:rPr lang="es-AR" smtClean="0"/>
-              <a:t>7/8/2023</a:t>
+              <a:t>14/8/2023</a:t>
             </a:fld>
             <a:endParaRPr lang="es-AR"/>
           </a:p>
@@ -1152,7 +1161,7 @@
           <a:p>
             <a:fld id="{9B0E0D05-D84D-45F3-A168-A386D8E82322}" type="datetimeFigureOut">
               <a:rPr lang="es-AR" smtClean="0"/>
-              <a:t>7/8/2023</a:t>
+              <a:t>14/8/2023</a:t>
             </a:fld>
             <a:endParaRPr lang="es-AR"/>
           </a:p>
@@ -1420,7 +1429,7 @@
           <a:p>
             <a:fld id="{9B0E0D05-D84D-45F3-A168-A386D8E82322}" type="datetimeFigureOut">
               <a:rPr lang="es-AR" smtClean="0"/>
-              <a:t>7/8/2023</a:t>
+              <a:t>14/8/2023</a:t>
             </a:fld>
             <a:endParaRPr lang="es-AR"/>
           </a:p>
@@ -1835,7 +1844,7 @@
           <a:p>
             <a:fld id="{9B0E0D05-D84D-45F3-A168-A386D8E82322}" type="datetimeFigureOut">
               <a:rPr lang="es-AR" smtClean="0"/>
-              <a:t>7/8/2023</a:t>
+              <a:t>14/8/2023</a:t>
             </a:fld>
             <a:endParaRPr lang="es-AR"/>
           </a:p>
@@ -1977,7 +1986,7 @@
           <a:p>
             <a:fld id="{9B0E0D05-D84D-45F3-A168-A386D8E82322}" type="datetimeFigureOut">
               <a:rPr lang="es-AR" smtClean="0"/>
-              <a:t>7/8/2023</a:t>
+              <a:t>14/8/2023</a:t>
             </a:fld>
             <a:endParaRPr lang="es-AR"/>
           </a:p>
@@ -2090,7 +2099,7 @@
           <a:p>
             <a:fld id="{9B0E0D05-D84D-45F3-A168-A386D8E82322}" type="datetimeFigureOut">
               <a:rPr lang="es-AR" smtClean="0"/>
-              <a:t>7/8/2023</a:t>
+              <a:t>14/8/2023</a:t>
             </a:fld>
             <a:endParaRPr lang="es-AR"/>
           </a:p>
@@ -2403,7 +2412,7 @@
           <a:p>
             <a:fld id="{9B0E0D05-D84D-45F3-A168-A386D8E82322}" type="datetimeFigureOut">
               <a:rPr lang="es-AR" smtClean="0"/>
-              <a:t>7/8/2023</a:t>
+              <a:t>14/8/2023</a:t>
             </a:fld>
             <a:endParaRPr lang="es-AR"/>
           </a:p>
@@ -2692,7 +2701,7 @@
           <a:p>
             <a:fld id="{9B0E0D05-D84D-45F3-A168-A386D8E82322}" type="datetimeFigureOut">
               <a:rPr lang="es-AR" smtClean="0"/>
-              <a:t>7/8/2023</a:t>
+              <a:t>14/8/2023</a:t>
             </a:fld>
             <a:endParaRPr lang="es-AR"/>
           </a:p>
@@ -2935,7 +2944,7 @@
           <a:p>
             <a:fld id="{9B0E0D05-D84D-45F3-A168-A386D8E82322}" type="datetimeFigureOut">
               <a:rPr lang="es-AR" smtClean="0"/>
-              <a:t>7/8/2023</a:t>
+              <a:t>14/8/2023</a:t>
             </a:fld>
             <a:endParaRPr lang="es-AR"/>
           </a:p>
@@ -3671,266 +3680,96 @@
       </p:grpSpPr>
       <p:sp>
         <p:nvSpPr>
-          <p:cNvPr id="5" name="CuadroTexto 4">
-            <a:extLst>
-              <a:ext uri="{FF2B5EF4-FFF2-40B4-BE49-F238E27FC236}">
-                <a16:creationId xmlns:a16="http://schemas.microsoft.com/office/drawing/2014/main" id="{CD2CF315-2107-0B13-1258-2949D1BC38BF}"/>
-              </a:ext>
-            </a:extLst>
-          </p:cNvPr>
-          <p:cNvSpPr txBox="1"/>
-          <p:nvPr/>
+          <p:cNvPr id="3" name="Marcador de contenido 2">
+            <a:extLst>
+              <a:ext uri="{FF2B5EF4-FFF2-40B4-BE49-F238E27FC236}">
+                <a16:creationId xmlns:a16="http://schemas.microsoft.com/office/drawing/2014/main" id="{A8E3DC90-1F03-7CC5-83B2-7251FE082A25}"/>
+              </a:ext>
+            </a:extLst>
+          </p:cNvPr>
+          <p:cNvSpPr>
+            <a:spLocks noGrp="1"/>
+          </p:cNvSpPr>
+          <p:nvPr>
+            <p:ph idx="1"/>
+          </p:nvPr>
         </p:nvSpPr>
         <p:spPr>
           <a:xfrm>
-            <a:off x="706794" y="446038"/>
-            <a:ext cx="10900487" cy="5569730"/>
+            <a:off x="578497" y="687293"/>
+            <a:ext cx="10926147" cy="768284"/>
+          </a:xfrm>
+        </p:spPr>
+        <p:txBody>
+          <a:bodyPr>
+            <a:normAutofit fontScale="92500"/>
+          </a:bodyPr>
+          <a:lstStyle/>
+          <a:p>
+            <a:pPr marL="0" indent="0" algn="l">
+              <a:buNone/>
+            </a:pPr>
+            <a:r>
+              <a:rPr lang="es-ES" sz="2400" b="1" dirty="0">
+                <a:solidFill>
+                  <a:srgbClr val="000000"/>
+                </a:solidFill>
+              </a:rPr>
+              <a:t>3. </a:t>
+            </a:r>
+            <a:r>
+              <a:rPr lang="es-ES" sz="2400" b="1" i="0" dirty="0">
+                <a:solidFill>
+                  <a:srgbClr val="000000"/>
+                </a:solidFill>
+                <a:effectLst/>
+                <a:latin typeface="Helvetica Neue"/>
+              </a:rPr>
+              <a:t>¿Cuál es el porcentaje de éxito de los regates realizados por los jugadores? ¿Algunos jugadores destacan por su habilidad para eludir a los defensores?</a:t>
+            </a:r>
+          </a:p>
+          <a:p>
+            <a:pPr marL="0" indent="0">
+              <a:buNone/>
+            </a:pPr>
+            <a:endParaRPr lang="es-AR" dirty="0"/>
+          </a:p>
+        </p:txBody>
+      </p:sp>
+      <p:pic>
+        <p:nvPicPr>
+          <p:cNvPr id="4" name="Imagen 3">
+            <a:extLst>
+              <a:ext uri="{FF2B5EF4-FFF2-40B4-BE49-F238E27FC236}">
+                <a16:creationId xmlns:a16="http://schemas.microsoft.com/office/drawing/2014/main" id="{E6FE8C41-331C-C380-C459-03E795FAA6DD}"/>
+              </a:ext>
+            </a:extLst>
+          </p:cNvPr>
+          <p:cNvPicPr>
+            <a:picLocks noChangeAspect="1"/>
+          </p:cNvPicPr>
+          <p:nvPr/>
+        </p:nvPicPr>
+        <p:blipFill>
+          <a:blip r:embed="rId2"/>
+          <a:stretch>
+            <a:fillRect/>
+          </a:stretch>
+        </p:blipFill>
+        <p:spPr>
+          <a:xfrm>
+            <a:off x="3851715" y="1852319"/>
+            <a:ext cx="4488569" cy="4534293"/>
           </a:xfrm>
           <a:prstGeom prst="rect">
             <a:avLst/>
           </a:prstGeom>
-          <a:noFill/>
         </p:spPr>
-        <p:txBody>
-          <a:bodyPr wrap="square">
-            <a:spAutoFit/>
-          </a:bodyPr>
-          <a:lstStyle/>
-          <a:p>
-            <a:pPr>
-              <a:lnSpc>
-                <a:spcPct val="70000"/>
-              </a:lnSpc>
-              <a:spcBef>
-                <a:spcPts val="1000"/>
-              </a:spcBef>
-            </a:pPr>
-            <a:r>
-              <a:rPr lang="es-ES" sz="2400" b="1" dirty="0">
-                <a:solidFill>
-                  <a:srgbClr val="000000"/>
-                </a:solidFill>
-              </a:rPr>
-              <a:t>6. Conclusiones</a:t>
-            </a:r>
-          </a:p>
-          <a:p>
-            <a:pPr>
-              <a:lnSpc>
-                <a:spcPct val="70000"/>
-              </a:lnSpc>
-              <a:spcBef>
-                <a:spcPts val="1000"/>
-              </a:spcBef>
-            </a:pPr>
-            <a:endParaRPr lang="es-ES" sz="2400" b="1" dirty="0">
-              <a:solidFill>
-                <a:srgbClr val="000000"/>
-              </a:solidFill>
-            </a:endParaRPr>
-          </a:p>
-          <a:p>
-            <a:pPr algn="l"/>
-            <a:r>
-              <a:rPr lang="es-ES" sz="2000" b="1" i="0" dirty="0">
-                <a:solidFill>
-                  <a:srgbClr val="000000"/>
-                </a:solidFill>
-                <a:effectLst/>
-                <a:latin typeface="Helvetica Neue"/>
-              </a:rPr>
-              <a:t>1. ¿Cuáles son los jugadores más efectivos en términos de goles marcados? ¿Existen diferencias significativas entre los distintos equipos en cuanto a la producción de goles?</a:t>
-            </a:r>
-          </a:p>
-          <a:p>
-            <a:pPr algn="l"/>
-            <a:endParaRPr lang="es-ES" sz="2000" b="1" i="0" dirty="0">
-              <a:solidFill>
-                <a:srgbClr val="000000"/>
-              </a:solidFill>
-              <a:effectLst/>
-              <a:latin typeface="Helvetica Neue"/>
-            </a:endParaRPr>
-          </a:p>
-          <a:p>
-            <a:pPr>
-              <a:spcBef>
-                <a:spcPts val="1000"/>
-              </a:spcBef>
-            </a:pPr>
-            <a:r>
-              <a:rPr lang="es-ES" sz="1900" dirty="0">
-                <a:solidFill>
-                  <a:srgbClr val="000000"/>
-                </a:solidFill>
-              </a:rPr>
-              <a:t>El rendimiento goleador de los equipos Manchester City, Paris S-G y Bayer </a:t>
-            </a:r>
-            <a:r>
-              <a:rPr lang="es-ES" sz="1900" dirty="0" err="1">
-                <a:solidFill>
-                  <a:srgbClr val="000000"/>
-                </a:solidFill>
-              </a:rPr>
-              <a:t>Munich</a:t>
-            </a:r>
-            <a:r>
-              <a:rPr lang="es-ES" sz="1900" dirty="0">
-                <a:solidFill>
-                  <a:srgbClr val="000000"/>
-                </a:solidFill>
-              </a:rPr>
-              <a:t> varía en función de la dependencia de ciertos jugadores. Mientras que el Manchester City se apoya fuertemente en Erling </a:t>
-            </a:r>
-            <a:r>
-              <a:rPr lang="es-ES" sz="1900" dirty="0" err="1">
-                <a:solidFill>
-                  <a:srgbClr val="000000"/>
-                </a:solidFill>
-              </a:rPr>
-              <a:t>Haaland</a:t>
-            </a:r>
-            <a:r>
-              <a:rPr lang="es-ES" sz="1900" dirty="0">
-                <a:solidFill>
-                  <a:srgbClr val="000000"/>
-                </a:solidFill>
-              </a:rPr>
-              <a:t> para la anotación de goles, Paris S-G confía en </a:t>
-            </a:r>
-            <a:r>
-              <a:rPr lang="es-ES" sz="1900" dirty="0" err="1">
-                <a:solidFill>
-                  <a:srgbClr val="000000"/>
-                </a:solidFill>
-              </a:rPr>
-              <a:t>Kylian</a:t>
-            </a:r>
-            <a:r>
-              <a:rPr lang="es-ES" sz="1900" dirty="0">
-                <a:solidFill>
-                  <a:srgbClr val="000000"/>
-                </a:solidFill>
-              </a:rPr>
-              <a:t> </a:t>
-            </a:r>
-            <a:r>
-              <a:rPr lang="es-ES" sz="1900" dirty="0" err="1">
-                <a:solidFill>
-                  <a:srgbClr val="000000"/>
-                </a:solidFill>
-              </a:rPr>
-              <a:t>Mbappé</a:t>
-            </a:r>
-            <a:r>
-              <a:rPr lang="es-ES" sz="1900" dirty="0">
-                <a:solidFill>
-                  <a:srgbClr val="000000"/>
-                </a:solidFill>
-              </a:rPr>
-              <a:t>, Neymar y Lionel Messi. Por otro lado, el equipo Bayer </a:t>
-            </a:r>
-            <a:r>
-              <a:rPr lang="es-ES" sz="1900" dirty="0" err="1">
-                <a:solidFill>
-                  <a:srgbClr val="000000"/>
-                </a:solidFill>
-              </a:rPr>
-              <a:t>Munich</a:t>
-            </a:r>
-            <a:r>
-              <a:rPr lang="es-ES" sz="1900" dirty="0">
-                <a:solidFill>
-                  <a:srgbClr val="000000"/>
-                </a:solidFill>
-              </a:rPr>
-              <a:t> muestra una distribución más equitativa en cuanto a la producción de goles, con varios jugadores contribuyendo de manera similar en términos de goles anotados".</a:t>
-            </a:r>
-          </a:p>
-          <a:p>
-            <a:pPr>
-              <a:spcBef>
-                <a:spcPts val="1000"/>
-              </a:spcBef>
-            </a:pPr>
-            <a:r>
-              <a:rPr lang="es-ES" sz="1900" dirty="0">
-                <a:solidFill>
-                  <a:srgbClr val="000000"/>
-                </a:solidFill>
-              </a:rPr>
-              <a:t>Esta hipótesis sugiere que la dependencia de un solo jugador para la producción de goles puede influir en el rendimiento goleador de un equipo. Mientras que el Manchester City depende en gran medida de Erling </a:t>
-            </a:r>
-            <a:r>
-              <a:rPr lang="es-ES" sz="1900" dirty="0" err="1">
-                <a:solidFill>
-                  <a:srgbClr val="000000"/>
-                </a:solidFill>
-              </a:rPr>
-              <a:t>Haaland</a:t>
-            </a:r>
-            <a:r>
-              <a:rPr lang="es-ES" sz="1900" dirty="0">
-                <a:solidFill>
-                  <a:srgbClr val="000000"/>
-                </a:solidFill>
-              </a:rPr>
-              <a:t>, Paris S-G cuenta con varios jugadores clave, y el Bayer </a:t>
-            </a:r>
-            <a:r>
-              <a:rPr lang="es-ES" sz="1900" dirty="0" err="1">
-                <a:solidFill>
-                  <a:srgbClr val="000000"/>
-                </a:solidFill>
-              </a:rPr>
-              <a:t>Munich</a:t>
-            </a:r>
-            <a:r>
-              <a:rPr lang="es-ES" sz="1900" dirty="0">
-                <a:solidFill>
-                  <a:srgbClr val="000000"/>
-                </a:solidFill>
-              </a:rPr>
-              <a:t> muestra una mayor distribución en la producción de goles entre sus jugadores.</a:t>
-            </a:r>
-          </a:p>
-          <a:p>
-            <a:pPr>
-              <a:spcBef>
-                <a:spcPts val="1000"/>
-              </a:spcBef>
-            </a:pPr>
-            <a:r>
-              <a:rPr lang="es-ES" sz="1900" dirty="0">
-                <a:solidFill>
-                  <a:srgbClr val="000000"/>
-                </a:solidFill>
-              </a:rPr>
-              <a:t>Si uno fuera rival de Manchester City, el planteo sería realizar una fuerte marcación contra Erling </a:t>
-            </a:r>
-            <a:r>
-              <a:rPr lang="es-ES" sz="1900" dirty="0" err="1">
-                <a:solidFill>
-                  <a:srgbClr val="000000"/>
-                </a:solidFill>
-              </a:rPr>
-              <a:t>Haaland</a:t>
-            </a:r>
-            <a:r>
-              <a:rPr lang="es-ES" sz="1900" dirty="0">
-                <a:solidFill>
-                  <a:srgbClr val="000000"/>
-                </a:solidFill>
-              </a:rPr>
-              <a:t> evitando que le llegue el balón.</a:t>
-            </a:r>
-          </a:p>
-        </p:txBody>
-      </p:sp>
+      </p:pic>
     </p:spTree>
     <p:extLst>
       <p:ext uri="{BB962C8B-B14F-4D97-AF65-F5344CB8AC3E}">
-        <p14:creationId xmlns:p14="http://schemas.microsoft.com/office/powerpoint/2010/main" val="4073182362"/>
+        <p14:creationId xmlns:p14="http://schemas.microsoft.com/office/powerpoint/2010/main" val="2960599325"/>
       </p:ext>
     </p:extLst>
   </p:cSld>
@@ -3959,6 +3798,406 @@
       </p:grpSpPr>
       <p:sp>
         <p:nvSpPr>
+          <p:cNvPr id="3" name="Marcador de contenido 2">
+            <a:extLst>
+              <a:ext uri="{FF2B5EF4-FFF2-40B4-BE49-F238E27FC236}">
+                <a16:creationId xmlns:a16="http://schemas.microsoft.com/office/drawing/2014/main" id="{A8E3DC90-1F03-7CC5-83B2-7251FE082A25}"/>
+              </a:ext>
+            </a:extLst>
+          </p:cNvPr>
+          <p:cNvSpPr>
+            <a:spLocks noGrp="1"/>
+          </p:cNvSpPr>
+          <p:nvPr>
+            <p:ph idx="1"/>
+          </p:nvPr>
+        </p:nvSpPr>
+        <p:spPr>
+          <a:xfrm>
+            <a:off x="578497" y="687293"/>
+            <a:ext cx="10926147" cy="768284"/>
+          </a:xfrm>
+        </p:spPr>
+        <p:txBody>
+          <a:bodyPr>
+            <a:normAutofit/>
+          </a:bodyPr>
+          <a:lstStyle/>
+          <a:p>
+            <a:pPr marL="0" indent="0" algn="l">
+              <a:buNone/>
+            </a:pPr>
+            <a:r>
+              <a:rPr lang="es-ES" sz="2400" b="1" dirty="0">
+                <a:solidFill>
+                  <a:srgbClr val="000000"/>
+                </a:solidFill>
+              </a:rPr>
+              <a:t>4. </a:t>
+            </a:r>
+            <a:r>
+              <a:rPr lang="es-ES" sz="2400" b="1" i="0" dirty="0">
+                <a:solidFill>
+                  <a:srgbClr val="000000"/>
+                </a:solidFill>
+                <a:effectLst/>
+                <a:latin typeface="Helvetica Neue"/>
+              </a:rPr>
+              <a:t>¿Qué jugadores tienen la mejor capacidad defensiva en términos de bloqueo de tiros y recuperación de balones?</a:t>
+            </a:r>
+          </a:p>
+        </p:txBody>
+      </p:sp>
+      <p:pic>
+        <p:nvPicPr>
+          <p:cNvPr id="5" name="Imagen 4">
+            <a:extLst>
+              <a:ext uri="{FF2B5EF4-FFF2-40B4-BE49-F238E27FC236}">
+                <a16:creationId xmlns:a16="http://schemas.microsoft.com/office/drawing/2014/main" id="{373AAFA8-6DFC-C4F2-15F2-196B2FD551E9}"/>
+              </a:ext>
+            </a:extLst>
+          </p:cNvPr>
+          <p:cNvPicPr>
+            <a:picLocks noChangeAspect="1"/>
+          </p:cNvPicPr>
+          <p:nvPr/>
+        </p:nvPicPr>
+        <p:blipFill>
+          <a:blip r:embed="rId2"/>
+          <a:stretch>
+            <a:fillRect/>
+          </a:stretch>
+        </p:blipFill>
+        <p:spPr>
+          <a:xfrm>
+            <a:off x="3822080" y="1611116"/>
+            <a:ext cx="4547840" cy="4559591"/>
+          </a:xfrm>
+          <a:prstGeom prst="rect">
+            <a:avLst/>
+          </a:prstGeom>
+        </p:spPr>
+      </p:pic>
+    </p:spTree>
+    <p:extLst>
+      <p:ext uri="{BB962C8B-B14F-4D97-AF65-F5344CB8AC3E}">
+        <p14:creationId xmlns:p14="http://schemas.microsoft.com/office/powerpoint/2010/main" val="4290995350"/>
+      </p:ext>
+    </p:extLst>
+  </p:cSld>
+  <p:clrMapOvr>
+    <a:masterClrMapping/>
+  </p:clrMapOvr>
+</p:sld>
+</file>
+
+<file path=ppt/slides/slide12.xml><?xml version="1.0" encoding="utf-8"?>
+<p:sld xmlns:a="http://schemas.openxmlformats.org/drawingml/2006/main" xmlns:r="http://schemas.openxmlformats.org/officeDocument/2006/relationships" xmlns:p="http://schemas.openxmlformats.org/presentationml/2006/main">
+  <p:cSld>
+    <p:spTree>
+      <p:nvGrpSpPr>
+        <p:cNvPr id="1" name=""/>
+        <p:cNvGrpSpPr/>
+        <p:nvPr/>
+      </p:nvGrpSpPr>
+      <p:grpSpPr>
+        <a:xfrm>
+          <a:off x="0" y="0"/>
+          <a:ext cx="0" cy="0"/>
+          <a:chOff x="0" y="0"/>
+          <a:chExt cx="0" cy="0"/>
+        </a:xfrm>
+      </p:grpSpPr>
+      <p:sp>
+        <p:nvSpPr>
+          <p:cNvPr id="5" name="CuadroTexto 4">
+            <a:extLst>
+              <a:ext uri="{FF2B5EF4-FFF2-40B4-BE49-F238E27FC236}">
+                <a16:creationId xmlns:a16="http://schemas.microsoft.com/office/drawing/2014/main" id="{CD2CF315-2107-0B13-1258-2949D1BC38BF}"/>
+              </a:ext>
+            </a:extLst>
+          </p:cNvPr>
+          <p:cNvSpPr txBox="1"/>
+          <p:nvPr/>
+        </p:nvSpPr>
+        <p:spPr>
+          <a:xfrm>
+            <a:off x="706794" y="446038"/>
+            <a:ext cx="10900487" cy="5569730"/>
+          </a:xfrm>
+          <a:prstGeom prst="rect">
+            <a:avLst/>
+          </a:prstGeom>
+          <a:noFill/>
+        </p:spPr>
+        <p:txBody>
+          <a:bodyPr wrap="square">
+            <a:spAutoFit/>
+          </a:bodyPr>
+          <a:lstStyle/>
+          <a:p>
+            <a:pPr>
+              <a:lnSpc>
+                <a:spcPct val="70000"/>
+              </a:lnSpc>
+              <a:spcBef>
+                <a:spcPts val="1000"/>
+              </a:spcBef>
+            </a:pPr>
+            <a:r>
+              <a:rPr lang="es-ES" sz="2400" b="1" dirty="0">
+                <a:solidFill>
+                  <a:srgbClr val="000000"/>
+                </a:solidFill>
+              </a:rPr>
+              <a:t>6. Conclusiones</a:t>
+            </a:r>
+          </a:p>
+          <a:p>
+            <a:pPr>
+              <a:lnSpc>
+                <a:spcPct val="70000"/>
+              </a:lnSpc>
+              <a:spcBef>
+                <a:spcPts val="1000"/>
+              </a:spcBef>
+            </a:pPr>
+            <a:endParaRPr lang="es-ES" sz="2400" b="1" dirty="0">
+              <a:solidFill>
+                <a:srgbClr val="000000"/>
+              </a:solidFill>
+            </a:endParaRPr>
+          </a:p>
+          <a:p>
+            <a:pPr algn="l"/>
+            <a:r>
+              <a:rPr lang="es-ES" sz="2000" b="1" i="0" dirty="0">
+                <a:solidFill>
+                  <a:srgbClr val="000000"/>
+                </a:solidFill>
+                <a:effectLst/>
+                <a:latin typeface="Helvetica Neue"/>
+              </a:rPr>
+              <a:t>1. ¿Cuáles son los jugadores más efectivos en términos de goles marcados? ¿Existen diferencias significativas entre los distintos equipos en cuanto a la producción de goles?</a:t>
+            </a:r>
+          </a:p>
+          <a:p>
+            <a:pPr algn="l"/>
+            <a:endParaRPr lang="es-ES" sz="2000" b="1" i="0" dirty="0">
+              <a:solidFill>
+                <a:srgbClr val="000000"/>
+              </a:solidFill>
+              <a:effectLst/>
+              <a:latin typeface="Helvetica Neue"/>
+            </a:endParaRPr>
+          </a:p>
+          <a:p>
+            <a:pPr>
+              <a:spcBef>
+                <a:spcPts val="1000"/>
+              </a:spcBef>
+            </a:pPr>
+            <a:r>
+              <a:rPr lang="es-ES" sz="1900" dirty="0">
+                <a:solidFill>
+                  <a:srgbClr val="000000"/>
+                </a:solidFill>
+              </a:rPr>
+              <a:t>El rendimiento goleador de los equipos Manchester City, Paris S-G y Bayer </a:t>
+            </a:r>
+            <a:r>
+              <a:rPr lang="es-ES" sz="1900" dirty="0" err="1">
+                <a:solidFill>
+                  <a:srgbClr val="000000"/>
+                </a:solidFill>
+              </a:rPr>
+              <a:t>Munich</a:t>
+            </a:r>
+            <a:r>
+              <a:rPr lang="es-ES" sz="1900" dirty="0">
+                <a:solidFill>
+                  <a:srgbClr val="000000"/>
+                </a:solidFill>
+              </a:rPr>
+              <a:t> varía en función de la dependencia de ciertos jugadores. Mientras que el Manchester City se apoya fuertemente en Erling </a:t>
+            </a:r>
+            <a:r>
+              <a:rPr lang="es-ES" sz="1900" dirty="0" err="1">
+                <a:solidFill>
+                  <a:srgbClr val="000000"/>
+                </a:solidFill>
+              </a:rPr>
+              <a:t>Haaland</a:t>
+            </a:r>
+            <a:r>
+              <a:rPr lang="es-ES" sz="1900" dirty="0">
+                <a:solidFill>
+                  <a:srgbClr val="000000"/>
+                </a:solidFill>
+              </a:rPr>
+              <a:t> para la anotación de goles, Paris S-G confía en </a:t>
+            </a:r>
+            <a:r>
+              <a:rPr lang="es-ES" sz="1900" dirty="0" err="1">
+                <a:solidFill>
+                  <a:srgbClr val="000000"/>
+                </a:solidFill>
+              </a:rPr>
+              <a:t>Kylian</a:t>
+            </a:r>
+            <a:r>
+              <a:rPr lang="es-ES" sz="1900" dirty="0">
+                <a:solidFill>
+                  <a:srgbClr val="000000"/>
+                </a:solidFill>
+              </a:rPr>
+              <a:t> </a:t>
+            </a:r>
+            <a:r>
+              <a:rPr lang="es-ES" sz="1900" dirty="0" err="1">
+                <a:solidFill>
+                  <a:srgbClr val="000000"/>
+                </a:solidFill>
+              </a:rPr>
+              <a:t>Mbappé</a:t>
+            </a:r>
+            <a:r>
+              <a:rPr lang="es-ES" sz="1900" dirty="0">
+                <a:solidFill>
+                  <a:srgbClr val="000000"/>
+                </a:solidFill>
+              </a:rPr>
+              <a:t>, Neymar y Lionel Messi. Por otro lado, el equipo Bayer </a:t>
+            </a:r>
+            <a:r>
+              <a:rPr lang="es-ES" sz="1900" dirty="0" err="1">
+                <a:solidFill>
+                  <a:srgbClr val="000000"/>
+                </a:solidFill>
+              </a:rPr>
+              <a:t>Munich</a:t>
+            </a:r>
+            <a:r>
+              <a:rPr lang="es-ES" sz="1900" dirty="0">
+                <a:solidFill>
+                  <a:srgbClr val="000000"/>
+                </a:solidFill>
+              </a:rPr>
+              <a:t> muestra una distribución más equitativa en cuanto a la producción de goles, con varios jugadores contribuyendo de manera similar en términos de goles anotados".</a:t>
+            </a:r>
+          </a:p>
+          <a:p>
+            <a:pPr>
+              <a:spcBef>
+                <a:spcPts val="1000"/>
+              </a:spcBef>
+            </a:pPr>
+            <a:r>
+              <a:rPr lang="es-ES" sz="1900" dirty="0">
+                <a:solidFill>
+                  <a:srgbClr val="000000"/>
+                </a:solidFill>
+              </a:rPr>
+              <a:t>Esta hipótesis sugiere que la dependencia de un solo jugador para la producción de goles puede influir en el rendimiento goleador de un equipo. Mientras que el Manchester City depende en gran medida de Erling </a:t>
+            </a:r>
+            <a:r>
+              <a:rPr lang="es-ES" sz="1900" dirty="0" err="1">
+                <a:solidFill>
+                  <a:srgbClr val="000000"/>
+                </a:solidFill>
+              </a:rPr>
+              <a:t>Haaland</a:t>
+            </a:r>
+            <a:r>
+              <a:rPr lang="es-ES" sz="1900" dirty="0">
+                <a:solidFill>
+                  <a:srgbClr val="000000"/>
+                </a:solidFill>
+              </a:rPr>
+              <a:t>, Paris S-G cuenta con varios jugadores clave, y el Bayer </a:t>
+            </a:r>
+            <a:r>
+              <a:rPr lang="es-ES" sz="1900" dirty="0" err="1">
+                <a:solidFill>
+                  <a:srgbClr val="000000"/>
+                </a:solidFill>
+              </a:rPr>
+              <a:t>Munich</a:t>
+            </a:r>
+            <a:r>
+              <a:rPr lang="es-ES" sz="1900" dirty="0">
+                <a:solidFill>
+                  <a:srgbClr val="000000"/>
+                </a:solidFill>
+              </a:rPr>
+              <a:t> muestra una mayor distribución en la producción de goles entre sus jugadores.</a:t>
+            </a:r>
+          </a:p>
+          <a:p>
+            <a:pPr>
+              <a:spcBef>
+                <a:spcPts val="1000"/>
+              </a:spcBef>
+            </a:pPr>
+            <a:r>
+              <a:rPr lang="es-ES" sz="1900" dirty="0">
+                <a:solidFill>
+                  <a:srgbClr val="000000"/>
+                </a:solidFill>
+              </a:rPr>
+              <a:t>Si uno fuera rival de Manchester City, el planteo sería realizar una fuerte marcación contra Erling </a:t>
+            </a:r>
+            <a:r>
+              <a:rPr lang="es-ES" sz="1900" dirty="0" err="1">
+                <a:solidFill>
+                  <a:srgbClr val="000000"/>
+                </a:solidFill>
+              </a:rPr>
+              <a:t>Haaland</a:t>
+            </a:r>
+            <a:r>
+              <a:rPr lang="es-ES" sz="1900" dirty="0">
+                <a:solidFill>
+                  <a:srgbClr val="000000"/>
+                </a:solidFill>
+              </a:rPr>
+              <a:t> evitando que le llegue el balón.</a:t>
+            </a:r>
+          </a:p>
+        </p:txBody>
+      </p:sp>
+    </p:spTree>
+    <p:extLst>
+      <p:ext uri="{BB962C8B-B14F-4D97-AF65-F5344CB8AC3E}">
+        <p14:creationId xmlns:p14="http://schemas.microsoft.com/office/powerpoint/2010/main" val="4073182362"/>
+      </p:ext>
+    </p:extLst>
+  </p:cSld>
+  <p:clrMapOvr>
+    <a:masterClrMapping/>
+  </p:clrMapOvr>
+</p:sld>
+</file>
+
+<file path=ppt/slides/slide13.xml><?xml version="1.0" encoding="utf-8"?>
+<p:sld xmlns:a="http://schemas.openxmlformats.org/drawingml/2006/main" xmlns:r="http://schemas.openxmlformats.org/officeDocument/2006/relationships" xmlns:p="http://schemas.openxmlformats.org/presentationml/2006/main">
+  <p:cSld>
+    <p:spTree>
+      <p:nvGrpSpPr>
+        <p:cNvPr id="1" name=""/>
+        <p:cNvGrpSpPr/>
+        <p:nvPr/>
+      </p:nvGrpSpPr>
+      <p:grpSpPr>
+        <a:xfrm>
+          <a:off x="0" y="0"/>
+          <a:ext cx="0" cy="0"/>
+          <a:chOff x="0" y="0"/>
+          <a:chExt cx="0" cy="0"/>
+        </a:xfrm>
+      </p:grpSpPr>
+      <p:sp>
+        <p:nvSpPr>
           <p:cNvPr id="5" name="CuadroTexto 4">
             <a:extLst>
               <a:ext uri="{FF2B5EF4-FFF2-40B4-BE49-F238E27FC236}">
@@ -4114,6 +4353,649 @@
     <p:extLst>
       <p:ext uri="{BB962C8B-B14F-4D97-AF65-F5344CB8AC3E}">
         <p14:creationId xmlns:p14="http://schemas.microsoft.com/office/powerpoint/2010/main" val="165415614"/>
+      </p:ext>
+    </p:extLst>
+  </p:cSld>
+  <p:clrMapOvr>
+    <a:masterClrMapping/>
+  </p:clrMapOvr>
+</p:sld>
+</file>
+
+<file path=ppt/slides/slide14.xml><?xml version="1.0" encoding="utf-8"?>
+<p:sld xmlns:a="http://schemas.openxmlformats.org/drawingml/2006/main" xmlns:r="http://schemas.openxmlformats.org/officeDocument/2006/relationships" xmlns:p="http://schemas.openxmlformats.org/presentationml/2006/main">
+  <p:cSld>
+    <p:spTree>
+      <p:nvGrpSpPr>
+        <p:cNvPr id="1" name=""/>
+        <p:cNvGrpSpPr/>
+        <p:nvPr/>
+      </p:nvGrpSpPr>
+      <p:grpSpPr>
+        <a:xfrm>
+          <a:off x="0" y="0"/>
+          <a:ext cx="0" cy="0"/>
+          <a:chOff x="0" y="0"/>
+          <a:chExt cx="0" cy="0"/>
+        </a:xfrm>
+      </p:grpSpPr>
+      <p:sp>
+        <p:nvSpPr>
+          <p:cNvPr id="5" name="CuadroTexto 4">
+            <a:extLst>
+              <a:ext uri="{FF2B5EF4-FFF2-40B4-BE49-F238E27FC236}">
+                <a16:creationId xmlns:a16="http://schemas.microsoft.com/office/drawing/2014/main" id="{CD2CF315-2107-0B13-1258-2949D1BC38BF}"/>
+              </a:ext>
+            </a:extLst>
+          </p:cNvPr>
+          <p:cNvSpPr txBox="1"/>
+          <p:nvPr/>
+        </p:nvSpPr>
+        <p:spPr>
+          <a:xfrm>
+            <a:off x="645756" y="278087"/>
+            <a:ext cx="10900487" cy="6323782"/>
+          </a:xfrm>
+          <a:prstGeom prst="rect">
+            <a:avLst/>
+          </a:prstGeom>
+          <a:noFill/>
+        </p:spPr>
+        <p:txBody>
+          <a:bodyPr wrap="square">
+            <a:spAutoFit/>
+          </a:bodyPr>
+          <a:lstStyle/>
+          <a:p>
+            <a:pPr>
+              <a:lnSpc>
+                <a:spcPct val="70000"/>
+              </a:lnSpc>
+              <a:spcBef>
+                <a:spcPts val="1000"/>
+              </a:spcBef>
+            </a:pPr>
+            <a:r>
+              <a:rPr lang="es-ES" sz="2400" b="1" dirty="0">
+                <a:solidFill>
+                  <a:srgbClr val="000000"/>
+                </a:solidFill>
+              </a:rPr>
+              <a:t>6. Conclusiones</a:t>
+            </a:r>
+          </a:p>
+          <a:p>
+            <a:pPr>
+              <a:lnSpc>
+                <a:spcPct val="70000"/>
+              </a:lnSpc>
+              <a:spcBef>
+                <a:spcPts val="1000"/>
+              </a:spcBef>
+            </a:pPr>
+            <a:endParaRPr lang="es-ES" sz="2400" b="1" dirty="0">
+              <a:solidFill>
+                <a:srgbClr val="000000"/>
+              </a:solidFill>
+            </a:endParaRPr>
+          </a:p>
+          <a:p>
+            <a:pPr algn="l"/>
+            <a:r>
+              <a:rPr lang="es-ES" sz="2000" b="1" i="0" dirty="0">
+                <a:solidFill>
+                  <a:srgbClr val="000000"/>
+                </a:solidFill>
+                <a:effectLst/>
+                <a:latin typeface="Helvetica Neue"/>
+              </a:rPr>
+              <a:t>3. ¿Cuál es el porcentaje de éxito de los regates realizados por los jugadores? ¿Algunos jugadores destacan por su habilidad para eludir a los defensores?</a:t>
+            </a:r>
+          </a:p>
+          <a:p>
+            <a:pPr algn="l"/>
+            <a:endParaRPr lang="es-ES" sz="2000" b="1" i="0" dirty="0">
+              <a:solidFill>
+                <a:srgbClr val="000000"/>
+              </a:solidFill>
+              <a:effectLst/>
+              <a:latin typeface="Helvetica Neue"/>
+            </a:endParaRPr>
+          </a:p>
+          <a:p>
+            <a:pPr>
+              <a:spcBef>
+                <a:spcPts val="1000"/>
+              </a:spcBef>
+            </a:pPr>
+            <a:r>
+              <a:rPr lang="es-ES" sz="1900" dirty="0">
+                <a:solidFill>
+                  <a:srgbClr val="000000"/>
+                </a:solidFill>
+              </a:rPr>
+              <a:t>El porcentaje de éxito de los regates es el número de regates completados con éxito dividido por el número de intentos de regates, multiplicado por 100. Por ejemplo, si un jugador tiene un porcentaje de éxito de regates del 75%, significa que ha completado con éxito 3 de cada 4 regates que ha intentado.</a:t>
+            </a:r>
+          </a:p>
+          <a:p>
+            <a:pPr>
+              <a:spcBef>
+                <a:spcPts val="1000"/>
+              </a:spcBef>
+            </a:pPr>
+            <a:endParaRPr lang="es-ES" sz="1900" dirty="0">
+              <a:solidFill>
+                <a:srgbClr val="000000"/>
+              </a:solidFill>
+            </a:endParaRPr>
+          </a:p>
+          <a:p>
+            <a:pPr>
+              <a:spcBef>
+                <a:spcPts val="1000"/>
+              </a:spcBef>
+            </a:pPr>
+            <a:r>
+              <a:rPr lang="es-ES" sz="1900" dirty="0">
+                <a:solidFill>
+                  <a:srgbClr val="000000"/>
+                </a:solidFill>
+              </a:rPr>
+              <a:t> De los jugadores de la tabla, el porcentaje de éxito de regates más alto es del 77.8%, que es de Mohammed </a:t>
+            </a:r>
+            <a:r>
+              <a:rPr lang="es-ES" sz="1900" dirty="0" err="1">
+                <a:solidFill>
+                  <a:srgbClr val="000000"/>
+                </a:solidFill>
+              </a:rPr>
+              <a:t>Salisu</a:t>
+            </a:r>
+            <a:r>
+              <a:rPr lang="es-ES" sz="1900" dirty="0">
+                <a:solidFill>
+                  <a:srgbClr val="000000"/>
+                </a:solidFill>
+              </a:rPr>
+              <a:t> de Southampton. </a:t>
+            </a:r>
+            <a:r>
+              <a:rPr lang="es-ES" sz="1900" dirty="0" err="1">
+                <a:solidFill>
+                  <a:srgbClr val="000000"/>
+                </a:solidFill>
+              </a:rPr>
+              <a:t>Salisu</a:t>
+            </a:r>
+            <a:r>
+              <a:rPr lang="es-ES" sz="1900" dirty="0">
+                <a:solidFill>
+                  <a:srgbClr val="000000"/>
+                </a:solidFill>
+              </a:rPr>
+              <a:t> ha intentado 43 regates y ha completado con éxito 33 de ellos.</a:t>
+            </a:r>
+          </a:p>
+          <a:p>
+            <a:pPr>
+              <a:spcBef>
+                <a:spcPts val="1000"/>
+              </a:spcBef>
+            </a:pPr>
+            <a:endParaRPr lang="es-ES" sz="1900" dirty="0">
+              <a:solidFill>
+                <a:srgbClr val="000000"/>
+              </a:solidFill>
+            </a:endParaRPr>
+          </a:p>
+          <a:p>
+            <a:pPr>
+              <a:spcBef>
+                <a:spcPts val="1000"/>
+              </a:spcBef>
+            </a:pPr>
+            <a:r>
+              <a:rPr lang="es-ES" sz="1900" dirty="0">
+                <a:solidFill>
+                  <a:srgbClr val="000000"/>
+                </a:solidFill>
+              </a:rPr>
+              <a:t>Otros jugadores que destacan por su habilidad para eludir a los defensores son:</a:t>
+            </a:r>
+          </a:p>
+          <a:p>
+            <a:pPr>
+              <a:spcBef>
+                <a:spcPts val="1000"/>
+              </a:spcBef>
+            </a:pPr>
+            <a:endParaRPr lang="es-ES" sz="1900" dirty="0">
+              <a:solidFill>
+                <a:srgbClr val="000000"/>
+              </a:solidFill>
+            </a:endParaRPr>
+          </a:p>
+          <a:p>
+            <a:pPr>
+              <a:spcBef>
+                <a:spcPts val="1000"/>
+              </a:spcBef>
+            </a:pPr>
+            <a:r>
+              <a:rPr lang="es-ES" sz="1900" dirty="0">
+                <a:solidFill>
+                  <a:srgbClr val="000000"/>
+                </a:solidFill>
+              </a:rPr>
+              <a:t>    James </a:t>
+            </a:r>
+            <a:r>
+              <a:rPr lang="es-ES" sz="1900" dirty="0" err="1">
+                <a:solidFill>
+                  <a:srgbClr val="000000"/>
+                </a:solidFill>
+              </a:rPr>
+              <a:t>Tarkowski</a:t>
+            </a:r>
+            <a:r>
+              <a:rPr lang="es-ES" sz="1900" dirty="0">
+                <a:solidFill>
+                  <a:srgbClr val="000000"/>
+                </a:solidFill>
+              </a:rPr>
+              <a:t> de </a:t>
+            </a:r>
+            <a:r>
+              <a:rPr lang="es-ES" sz="1900" dirty="0" err="1">
+                <a:solidFill>
+                  <a:srgbClr val="000000"/>
+                </a:solidFill>
+              </a:rPr>
+              <a:t>Everton</a:t>
+            </a:r>
+            <a:r>
+              <a:rPr lang="es-ES" sz="1900" dirty="0">
+                <a:solidFill>
+                  <a:srgbClr val="000000"/>
+                </a:solidFill>
+              </a:rPr>
+              <a:t>, con un porcentaje de éxito de regates del 83.3%.</a:t>
+            </a:r>
+          </a:p>
+          <a:p>
+            <a:pPr>
+              <a:spcBef>
+                <a:spcPts val="1000"/>
+              </a:spcBef>
+            </a:pPr>
+            <a:r>
+              <a:rPr lang="es-ES" sz="1900" dirty="0">
+                <a:solidFill>
+                  <a:srgbClr val="000000"/>
+                </a:solidFill>
+              </a:rPr>
+              <a:t>    </a:t>
+            </a:r>
+            <a:r>
+              <a:rPr lang="es-ES" sz="1900" dirty="0" err="1">
+                <a:solidFill>
+                  <a:srgbClr val="000000"/>
+                </a:solidFill>
+              </a:rPr>
+              <a:t>Mateusz</a:t>
+            </a:r>
+            <a:r>
+              <a:rPr lang="es-ES" sz="1900" dirty="0">
+                <a:solidFill>
+                  <a:srgbClr val="000000"/>
+                </a:solidFill>
+              </a:rPr>
+              <a:t> </a:t>
+            </a:r>
+            <a:r>
+              <a:rPr lang="es-ES" sz="1900" dirty="0" err="1">
+                <a:solidFill>
+                  <a:srgbClr val="000000"/>
+                </a:solidFill>
+              </a:rPr>
+              <a:t>Wieteska</a:t>
+            </a:r>
+            <a:r>
+              <a:rPr lang="es-ES" sz="1900" dirty="0">
+                <a:solidFill>
+                  <a:srgbClr val="000000"/>
+                </a:solidFill>
+              </a:rPr>
+              <a:t> de Clermont </a:t>
+            </a:r>
+            <a:r>
+              <a:rPr lang="es-ES" sz="1900" dirty="0" err="1">
+                <a:solidFill>
+                  <a:srgbClr val="000000"/>
+                </a:solidFill>
+              </a:rPr>
+              <a:t>Foot</a:t>
+            </a:r>
+            <a:r>
+              <a:rPr lang="es-ES" sz="1900" dirty="0">
+                <a:solidFill>
+                  <a:srgbClr val="000000"/>
+                </a:solidFill>
+              </a:rPr>
+              <a:t>, con un porcentaje de éxito de regates del 80.0%.</a:t>
+            </a:r>
+          </a:p>
+          <a:p>
+            <a:pPr>
+              <a:spcBef>
+                <a:spcPts val="1000"/>
+              </a:spcBef>
+            </a:pPr>
+            <a:r>
+              <a:rPr lang="es-ES" sz="1900" dirty="0">
+                <a:solidFill>
+                  <a:srgbClr val="000000"/>
+                </a:solidFill>
+              </a:rPr>
+              <a:t>    Pierre </a:t>
+            </a:r>
+            <a:r>
+              <a:rPr lang="es-ES" sz="1900" dirty="0" err="1">
+                <a:solidFill>
+                  <a:srgbClr val="000000"/>
+                </a:solidFill>
+              </a:rPr>
+              <a:t>Højbjerg</a:t>
+            </a:r>
+            <a:r>
+              <a:rPr lang="es-ES" sz="1900" dirty="0">
+                <a:solidFill>
+                  <a:srgbClr val="000000"/>
+                </a:solidFill>
+              </a:rPr>
+              <a:t> de Tottenham, con un porcentaje de éxito de regates del 72.7%.</a:t>
+            </a:r>
+          </a:p>
+        </p:txBody>
+      </p:sp>
+    </p:spTree>
+    <p:extLst>
+      <p:ext uri="{BB962C8B-B14F-4D97-AF65-F5344CB8AC3E}">
+        <p14:creationId xmlns:p14="http://schemas.microsoft.com/office/powerpoint/2010/main" val="1094534315"/>
+      </p:ext>
+    </p:extLst>
+  </p:cSld>
+  <p:clrMapOvr>
+    <a:masterClrMapping/>
+  </p:clrMapOvr>
+</p:sld>
+</file>
+
+<file path=ppt/slides/slide15.xml><?xml version="1.0" encoding="utf-8"?>
+<p:sld xmlns:a="http://schemas.openxmlformats.org/drawingml/2006/main" xmlns:r="http://schemas.openxmlformats.org/officeDocument/2006/relationships" xmlns:p="http://schemas.openxmlformats.org/presentationml/2006/main">
+  <p:cSld>
+    <p:spTree>
+      <p:nvGrpSpPr>
+        <p:cNvPr id="1" name=""/>
+        <p:cNvGrpSpPr/>
+        <p:nvPr/>
+      </p:nvGrpSpPr>
+      <p:grpSpPr>
+        <a:xfrm>
+          <a:off x="0" y="0"/>
+          <a:ext cx="0" cy="0"/>
+          <a:chOff x="0" y="0"/>
+          <a:chExt cx="0" cy="0"/>
+        </a:xfrm>
+      </p:grpSpPr>
+      <p:sp>
+        <p:nvSpPr>
+          <p:cNvPr id="5" name="CuadroTexto 4">
+            <a:extLst>
+              <a:ext uri="{FF2B5EF4-FFF2-40B4-BE49-F238E27FC236}">
+                <a16:creationId xmlns:a16="http://schemas.microsoft.com/office/drawing/2014/main" id="{CD2CF315-2107-0B13-1258-2949D1BC38BF}"/>
+              </a:ext>
+            </a:extLst>
+          </p:cNvPr>
+          <p:cNvSpPr txBox="1"/>
+          <p:nvPr/>
+        </p:nvSpPr>
+        <p:spPr>
+          <a:xfrm>
+            <a:off x="645756" y="278087"/>
+            <a:ext cx="10900487" cy="5190139"/>
+          </a:xfrm>
+          <a:prstGeom prst="rect">
+            <a:avLst/>
+          </a:prstGeom>
+          <a:noFill/>
+        </p:spPr>
+        <p:txBody>
+          <a:bodyPr wrap="square">
+            <a:spAutoFit/>
+          </a:bodyPr>
+          <a:lstStyle/>
+          <a:p>
+            <a:pPr>
+              <a:lnSpc>
+                <a:spcPct val="70000"/>
+              </a:lnSpc>
+              <a:spcBef>
+                <a:spcPts val="1000"/>
+              </a:spcBef>
+            </a:pPr>
+            <a:r>
+              <a:rPr lang="es-ES" sz="2400" b="1" dirty="0">
+                <a:solidFill>
+                  <a:srgbClr val="000000"/>
+                </a:solidFill>
+              </a:rPr>
+              <a:t>6. Conclusiones</a:t>
+            </a:r>
+          </a:p>
+          <a:p>
+            <a:pPr>
+              <a:lnSpc>
+                <a:spcPct val="70000"/>
+              </a:lnSpc>
+              <a:spcBef>
+                <a:spcPts val="1000"/>
+              </a:spcBef>
+            </a:pPr>
+            <a:endParaRPr lang="es-ES" sz="2400" b="1" dirty="0">
+              <a:solidFill>
+                <a:srgbClr val="000000"/>
+              </a:solidFill>
+            </a:endParaRPr>
+          </a:p>
+          <a:p>
+            <a:pPr algn="l"/>
+            <a:r>
+              <a:rPr lang="es-ES" sz="2000" b="1" dirty="0">
+                <a:solidFill>
+                  <a:srgbClr val="000000"/>
+                </a:solidFill>
+                <a:latin typeface="Helvetica Neue"/>
+              </a:rPr>
+              <a:t>4</a:t>
+            </a:r>
+            <a:r>
+              <a:rPr lang="es-ES" sz="2000" b="1" i="0" dirty="0">
+                <a:solidFill>
+                  <a:srgbClr val="000000"/>
+                </a:solidFill>
+                <a:effectLst/>
+                <a:latin typeface="Helvetica Neue"/>
+              </a:rPr>
+              <a:t>. ¿Qué jugadores tienen la mejor capacidad defensiva en términos de bloqueo de tiros y recuperación de balones?</a:t>
+            </a:r>
+          </a:p>
+          <a:p>
+            <a:pPr algn="l"/>
+            <a:endParaRPr lang="es-ES" sz="2000" b="1" i="0" dirty="0">
+              <a:solidFill>
+                <a:srgbClr val="000000"/>
+              </a:solidFill>
+              <a:effectLst/>
+              <a:latin typeface="Helvetica Neue"/>
+            </a:endParaRPr>
+          </a:p>
+          <a:p>
+            <a:pPr>
+              <a:spcBef>
+                <a:spcPts val="1000"/>
+              </a:spcBef>
+            </a:pPr>
+            <a:r>
+              <a:rPr lang="es-ES" sz="1900" dirty="0">
+                <a:solidFill>
+                  <a:srgbClr val="000000"/>
+                </a:solidFill>
+              </a:rPr>
+              <a:t>Los jugadores con la mejor capacidad defensiva en términos de bloqueo de tiros y recuperación de balones son:</a:t>
+            </a:r>
+          </a:p>
+          <a:p>
+            <a:pPr>
+              <a:spcBef>
+                <a:spcPts val="1000"/>
+              </a:spcBef>
+            </a:pPr>
+            <a:endParaRPr lang="es-ES" sz="1900" dirty="0">
+              <a:solidFill>
+                <a:srgbClr val="000000"/>
+              </a:solidFill>
+            </a:endParaRPr>
+          </a:p>
+          <a:p>
+            <a:pPr>
+              <a:spcBef>
+                <a:spcPts val="1000"/>
+              </a:spcBef>
+            </a:pPr>
+            <a:r>
+              <a:rPr lang="es-ES" sz="1900" dirty="0">
+                <a:solidFill>
+                  <a:srgbClr val="000000"/>
+                </a:solidFill>
+              </a:rPr>
+              <a:t>    Diego </a:t>
+            </a:r>
+            <a:r>
+              <a:rPr lang="es-ES" sz="1900" dirty="0" err="1">
+                <a:solidFill>
+                  <a:srgbClr val="000000"/>
+                </a:solidFill>
+              </a:rPr>
+              <a:t>Demme</a:t>
+            </a:r>
+            <a:r>
+              <a:rPr lang="es-ES" sz="1900" dirty="0">
+                <a:solidFill>
+                  <a:srgbClr val="000000"/>
+                </a:solidFill>
+              </a:rPr>
+              <a:t> (5.00 bloqueos de tiros, 230.0 recuperaciones de balones)</a:t>
+            </a:r>
+          </a:p>
+          <a:p>
+            <a:pPr>
+              <a:spcBef>
+                <a:spcPts val="1000"/>
+              </a:spcBef>
+            </a:pPr>
+            <a:r>
+              <a:rPr lang="es-ES" sz="1900" dirty="0">
+                <a:solidFill>
+                  <a:srgbClr val="000000"/>
+                </a:solidFill>
+              </a:rPr>
+              <a:t>    </a:t>
+            </a:r>
+            <a:r>
+              <a:rPr lang="es-ES" sz="1900" dirty="0" err="1">
+                <a:solidFill>
+                  <a:srgbClr val="000000"/>
+                </a:solidFill>
+              </a:rPr>
+              <a:t>Kalvin</a:t>
+            </a:r>
+            <a:r>
+              <a:rPr lang="es-ES" sz="1900" dirty="0">
+                <a:solidFill>
+                  <a:srgbClr val="000000"/>
+                </a:solidFill>
+              </a:rPr>
+              <a:t> Phillips (10.00 bloqueos de tiros, 90.0 recuperaciones de balones)</a:t>
+            </a:r>
+          </a:p>
+          <a:p>
+            <a:pPr>
+              <a:spcBef>
+                <a:spcPts val="1000"/>
+              </a:spcBef>
+            </a:pPr>
+            <a:r>
+              <a:rPr lang="es-ES" sz="1900" dirty="0">
+                <a:solidFill>
+                  <a:srgbClr val="000000"/>
+                </a:solidFill>
+              </a:rPr>
+              <a:t>    Leandro Paredes (3.33 bloqueos de tiros, 103.3 recuperaciones de balones)</a:t>
+            </a:r>
+          </a:p>
+          <a:p>
+            <a:pPr>
+              <a:spcBef>
+                <a:spcPts val="1000"/>
+              </a:spcBef>
+            </a:pPr>
+            <a:r>
+              <a:rPr lang="es-ES" sz="1900" dirty="0">
+                <a:solidFill>
+                  <a:srgbClr val="000000"/>
+                </a:solidFill>
+              </a:rPr>
+              <a:t>   </a:t>
+            </a:r>
+          </a:p>
+          <a:p>
+            <a:pPr>
+              <a:spcBef>
+                <a:spcPts val="1000"/>
+              </a:spcBef>
+            </a:pPr>
+            <a:r>
+              <a:rPr lang="es-ES" sz="1900" dirty="0">
+                <a:solidFill>
+                  <a:srgbClr val="000000"/>
+                </a:solidFill>
+              </a:rPr>
+              <a:t>Estos tres jugadores han bloqueado más tiros y recuperado más balones que los demás jugadores de la tabla. </a:t>
+            </a:r>
+            <a:r>
+              <a:rPr lang="es-ES" sz="1900" dirty="0" err="1">
+                <a:solidFill>
+                  <a:srgbClr val="000000"/>
+                </a:solidFill>
+              </a:rPr>
+              <a:t>Demme</a:t>
+            </a:r>
+            <a:r>
+              <a:rPr lang="es-ES" sz="1900" dirty="0">
+                <a:solidFill>
+                  <a:srgbClr val="000000"/>
+                </a:solidFill>
+              </a:rPr>
+              <a:t> tiene la mejor puntuación defensiva de 235.0, seguido de Phillips con 225.0 y Paredes con 204.6.</a:t>
+            </a:r>
+          </a:p>
+        </p:txBody>
+      </p:sp>
+    </p:spTree>
+    <p:extLst>
+      <p:ext uri="{BB962C8B-B14F-4D97-AF65-F5344CB8AC3E}">
+        <p14:creationId xmlns:p14="http://schemas.microsoft.com/office/powerpoint/2010/main" val="1438671771"/>
       </p:ext>
     </p:extLst>
   </p:cSld>
@@ -6077,7 +6959,7 @@
         </p:blipFill>
         <p:spPr bwMode="auto">
           <a:xfrm>
-            <a:off x="214918" y="2671301"/>
+            <a:off x="205587" y="2671301"/>
             <a:ext cx="3908001" cy="2908403"/>
           </a:xfrm>
           <a:prstGeom prst="rect">
@@ -6124,7 +7006,7 @@
         </p:blipFill>
         <p:spPr bwMode="auto">
           <a:xfrm>
-            <a:off x="4184373" y="2616337"/>
+            <a:off x="4156380" y="2634999"/>
             <a:ext cx="3819331" cy="2963367"/>
           </a:xfrm>
           <a:prstGeom prst="rect">
@@ -6171,7 +7053,7 @@
         </p:blipFill>
         <p:spPr bwMode="auto">
           <a:xfrm>
-            <a:off x="8069081" y="2671301"/>
+            <a:off x="8069081" y="2615315"/>
             <a:ext cx="3908001" cy="2989757"/>
           </a:xfrm>
           <a:prstGeom prst="rect">

</xml_diff>